<commit_message>
Improved Power Point Presentation
</commit_message>
<xml_diff>
--- a/Solution to coronavirus.pptx
+++ b/Solution to coronavirus.pptx
@@ -738,7 +738,7 @@
             <a:fld id="{BF5CE1C9-3A05-4FE3-8757-698835B4C8F4}" type="datetimeFigureOut">
               <a:rPr lang="en-US" smtClean="0"/>
               <a:pPr/>
-              <a:t>4/8/2020</a:t>
+              <a:t>4/9/2020</a:t>
             </a:fld>
             <a:endParaRPr lang="en-US"/>
           </a:p>
@@ -936,7 +936,7 @@
             <a:fld id="{BF5CE1C9-3A05-4FE3-8757-698835B4C8F4}" type="datetimeFigureOut">
               <a:rPr lang="en-US" smtClean="0"/>
               <a:pPr/>
-              <a:t>4/8/2020</a:t>
+              <a:t>4/9/2020</a:t>
             </a:fld>
             <a:endParaRPr lang="en-US"/>
           </a:p>
@@ -1123,7 +1123,7 @@
             <a:fld id="{BF5CE1C9-3A05-4FE3-8757-698835B4C8F4}" type="datetimeFigureOut">
               <a:rPr lang="en-US" smtClean="0"/>
               <a:pPr/>
-              <a:t>4/8/2020</a:t>
+              <a:t>4/9/2020</a:t>
             </a:fld>
             <a:endParaRPr lang="en-US"/>
           </a:p>
@@ -1275,7 +1275,7 @@
             <a:fld id="{BF5CE1C9-3A05-4FE3-8757-698835B4C8F4}" type="datetimeFigureOut">
               <a:rPr lang="en-US" smtClean="0"/>
               <a:pPr/>
-              <a:t>4/8/2020</a:t>
+              <a:t>4/9/2020</a:t>
             </a:fld>
             <a:endParaRPr lang="en-US"/>
           </a:p>
@@ -1532,7 +1532,7 @@
             <a:fld id="{BF5CE1C9-3A05-4FE3-8757-698835B4C8F4}" type="datetimeFigureOut">
               <a:rPr lang="en-US" smtClean="0"/>
               <a:pPr/>
-              <a:t>4/8/2020</a:t>
+              <a:t>4/9/2020</a:t>
             </a:fld>
             <a:endParaRPr lang="en-US"/>
           </a:p>
@@ -1943,7 +1943,7 @@
             <a:fld id="{BF5CE1C9-3A05-4FE3-8757-698835B4C8F4}" type="datetimeFigureOut">
               <a:rPr lang="en-US" smtClean="0"/>
               <a:pPr/>
-              <a:t>4/8/2020</a:t>
+              <a:t>4/9/2020</a:t>
             </a:fld>
             <a:endParaRPr lang="en-US"/>
           </a:p>
@@ -2391,7 +2391,7 @@
             <a:fld id="{BF5CE1C9-3A05-4FE3-8757-698835B4C8F4}" type="datetimeFigureOut">
               <a:rPr lang="en-US" smtClean="0"/>
               <a:pPr/>
-              <a:t>4/8/2020</a:t>
+              <a:t>4/9/2020</a:t>
             </a:fld>
             <a:endParaRPr lang="en-US"/>
           </a:p>
@@ -2494,7 +2494,7 @@
             <a:fld id="{BF5CE1C9-3A05-4FE3-8757-698835B4C8F4}" type="datetimeFigureOut">
               <a:rPr lang="en-US" smtClean="0"/>
               <a:pPr/>
-              <a:t>4/8/2020</a:t>
+              <a:t>4/9/2020</a:t>
             </a:fld>
             <a:endParaRPr lang="en-US"/>
           </a:p>
@@ -2617,7 +2617,7 @@
             <a:fld id="{BF5CE1C9-3A05-4FE3-8757-698835B4C8F4}" type="datetimeFigureOut">
               <a:rPr lang="en-US" smtClean="0"/>
               <a:pPr/>
-              <a:t>4/8/2020</a:t>
+              <a:t>4/9/2020</a:t>
             </a:fld>
             <a:endParaRPr lang="en-US"/>
           </a:p>
@@ -2893,7 +2893,7 @@
             <a:fld id="{BF5CE1C9-3A05-4FE3-8757-698835B4C8F4}" type="datetimeFigureOut">
               <a:rPr lang="en-US" smtClean="0"/>
               <a:pPr/>
-              <a:t>4/8/2020</a:t>
+              <a:t>4/9/2020</a:t>
             </a:fld>
             <a:endParaRPr lang="en-US"/>
           </a:p>
@@ -3100,7 +3100,7 @@
             <a:fld id="{BF5CE1C9-3A05-4FE3-8757-698835B4C8F4}" type="datetimeFigureOut">
               <a:rPr lang="en-US" smtClean="0"/>
               <a:pPr/>
-              <a:t>4/8/2020</a:t>
+              <a:t>4/9/2020</a:t>
             </a:fld>
             <a:endParaRPr lang="en-US"/>
           </a:p>
@@ -4211,7 +4211,7 @@
             <a:fld id="{BF5CE1C9-3A05-4FE3-8757-698835B4C8F4}" type="datetimeFigureOut">
               <a:rPr lang="en-US" smtClean="0"/>
               <a:pPr/>
-              <a:t>4/8/2020</a:t>
+              <a:t>4/9/2020</a:t>
             </a:fld>
             <a:endParaRPr lang="en-US"/>
           </a:p>
@@ -4879,8 +4879,12 @@
               <a:t>Pain </a:t>
             </a:r>
             <a:r>
-              <a:rPr lang="en-US" dirty="0" err="1" smtClean="0"/>
-              <a:t>InThroat</a:t>
+              <a:rPr lang="en-US" dirty="0" smtClean="0"/>
+              <a:t>i</a:t>
+            </a:r>
+            <a:r>
+              <a:rPr lang="en-US" dirty="0" smtClean="0"/>
+              <a:t>n Throat</a:t>
             </a:r>
             <a:endParaRPr lang="en-US" dirty="0" smtClean="0"/>
           </a:p>
@@ -5086,11 +5090,7 @@
             <a:pPr algn="just"/>
             <a:r>
               <a:rPr lang="en-IN" dirty="0" smtClean="0"/>
-              <a:t>Many other ml engineers can work on this model. I have just written very few lines of code but this idea can be used and it has the potential to improve the current situation</a:t>
-            </a:r>
-            <a:r>
-              <a:rPr lang="en-IN" dirty="0" smtClean="0"/>
-              <a:t>.</a:t>
+              <a:t>Many other ml engineers can work on this model. I have just written very few lines of code but this idea can be used and it has the potential to improve the current situation.</a:t>
             </a:r>
           </a:p>
           <a:p>
@@ -5101,11 +5101,7 @@
             <a:pPr algn="just"/>
             <a:r>
               <a:rPr lang="en-IN" dirty="0" smtClean="0"/>
-              <a:t>By fine tu</a:t>
-            </a:r>
-            <a:r>
-              <a:rPr lang="en-IN" dirty="0" smtClean="0"/>
-              <a:t>ning the model and by trying out different classification algorithms, we </a:t>
+              <a:t>By fine tuning the model and by trying out different classification algorithms, we </a:t>
             </a:r>
             <a:r>
               <a:rPr lang="en-IN" smtClean="0"/>

</xml_diff>